<commit_message>
Cập nhật báo cáo....
Thêm vài định nghĩa toán học cho các mô hình.
</commit_message>
<xml_diff>
--- a/_BaoCao/quocdunginfo/EF features model.pptx
+++ b/_BaoCao/quocdunginfo/EF features model.pptx
@@ -6,6 +6,7 @@
   </p:sldMasterIdLst>
   <p:sldIdLst>
     <p:sldId id="256" r:id="rId2"/>
+    <p:sldId id="257" r:id="rId3"/>
   </p:sldIdLst>
   <p:sldSz cx="12192000" cy="6858000"/>
   <p:notesSz cx="6858000" cy="9144000"/>
@@ -104,6 +105,11 @@
       </a:defRPr>
     </a:lvl9pPr>
   </p:defaultTextStyle>
+  <p:extLst>
+    <p:ext uri="{EFAFB233-063F-42B5-8137-9DF3F51BA10A}">
+      <p15:sldGuideLst xmlns:p15="http://schemas.microsoft.com/office/powerpoint/2012/main"/>
+    </p:ext>
+  </p:extLst>
 </p:presentation>
 </file>
 
@@ -3819,14 +3825,6 @@
               </a:rPr>
               <a:t>bước qua hàm nạp điều kiện</a:t>
             </a:r>
-            <a:endParaRPr lang="en-US" sz="1600" smtClean="0">
-              <a:solidFill>
-                <a:schemeClr val="tx1"/>
-              </a:solidFill>
-              <a:latin typeface="Tahoma" panose="020B0604030504040204" pitchFamily="34" charset="0"/>
-              <a:ea typeface="Tahoma" panose="020B0604030504040204" pitchFamily="34" charset="0"/>
-              <a:cs typeface="Tahoma" panose="020B0604030504040204" pitchFamily="34" charset="0"/>
-            </a:endParaRPr>
           </a:p>
         </p:txBody>
       </p:sp>
@@ -3869,6 +3867,838 @@
     <p:extLst>
       <p:ext uri="{BB962C8B-B14F-4D97-AF65-F5344CB8AC3E}">
         <p14:creationId xmlns:p14="http://schemas.microsoft.com/office/powerpoint/2010/main" val="3577535033"/>
+      </p:ext>
+    </p:extLst>
+  </p:cSld>
+  <p:clrMapOvr>
+    <a:masterClrMapping/>
+  </p:clrMapOvr>
+</p:sld>
+</file>
+
+<file path=ppt/slides/slide2.xml><?xml version="1.0" encoding="utf-8"?>
+<p:sld xmlns:a="http://schemas.openxmlformats.org/drawingml/2006/main" xmlns:r="http://schemas.openxmlformats.org/officeDocument/2006/relationships" xmlns:p="http://schemas.openxmlformats.org/presentationml/2006/main">
+  <p:cSld>
+    <p:spTree>
+      <p:nvGrpSpPr>
+        <p:cNvPr id="1" name=""/>
+        <p:cNvGrpSpPr/>
+        <p:nvPr/>
+      </p:nvGrpSpPr>
+      <p:grpSpPr>
+        <a:xfrm>
+          <a:off x="0" y="0"/>
+          <a:ext cx="0" cy="0"/>
+          <a:chOff x="0" y="0"/>
+          <a:chExt cx="0" cy="0"/>
+        </a:xfrm>
+      </p:grpSpPr>
+      <p:sp>
+        <p:nvSpPr>
+          <p:cNvPr id="5" name="Rectangle 4"/>
+          <p:cNvSpPr/>
+          <p:nvPr/>
+        </p:nvSpPr>
+        <p:spPr>
+          <a:xfrm>
+            <a:off x="1806084" y="587172"/>
+            <a:ext cx="1453243" cy="435429"/>
+          </a:xfrm>
+          <a:prstGeom prst="rect">
+            <a:avLst/>
+          </a:prstGeom>
+          <a:solidFill>
+            <a:schemeClr val="bg1"/>
+          </a:solidFill>
+          <a:ln>
+            <a:solidFill>
+              <a:schemeClr val="tx1"/>
+            </a:solidFill>
+          </a:ln>
+        </p:spPr>
+        <p:style>
+          <a:lnRef idx="2">
+            <a:schemeClr val="accent1">
+              <a:shade val="50000"/>
+            </a:schemeClr>
+          </a:lnRef>
+          <a:fillRef idx="1">
+            <a:schemeClr val="accent1"/>
+          </a:fillRef>
+          <a:effectRef idx="0">
+            <a:schemeClr val="accent1"/>
+          </a:effectRef>
+          <a:fontRef idx="minor">
+            <a:schemeClr val="lt1"/>
+          </a:fontRef>
+        </p:style>
+        <p:txBody>
+          <a:bodyPr rtlCol="0" anchor="ctr"/>
+          <a:lstStyle/>
+          <a:p>
+            <a:r>
+              <a:rPr lang="en-US" sz="1600" smtClean="0">
+                <a:solidFill>
+                  <a:schemeClr val="tx1"/>
+                </a:solidFill>
+                <a:latin typeface="Tahoma" panose="020B0604030504040204" pitchFamily="34" charset="0"/>
+                <a:ea typeface="Tahoma" panose="020B0604030504040204" pitchFamily="34" charset="0"/>
+                <a:cs typeface="Tahoma" panose="020B0604030504040204" pitchFamily="34" charset="0"/>
+              </a:rPr>
+              <a:t>Đối tượng A</a:t>
+            </a:r>
+            <a:endParaRPr lang="en-US" sz="1600">
+              <a:solidFill>
+                <a:schemeClr val="tx1"/>
+              </a:solidFill>
+              <a:latin typeface="Tahoma" panose="020B0604030504040204" pitchFamily="34" charset="0"/>
+              <a:ea typeface="Tahoma" panose="020B0604030504040204" pitchFamily="34" charset="0"/>
+              <a:cs typeface="Tahoma" panose="020B0604030504040204" pitchFamily="34" charset="0"/>
+            </a:endParaRPr>
+          </a:p>
+        </p:txBody>
+      </p:sp>
+      <p:sp>
+        <p:nvSpPr>
+          <p:cNvPr id="8" name="Rectangle 7"/>
+          <p:cNvSpPr/>
+          <p:nvPr/>
+        </p:nvSpPr>
+        <p:spPr>
+          <a:xfrm>
+            <a:off x="1806084" y="1768704"/>
+            <a:ext cx="1453243" cy="435429"/>
+          </a:xfrm>
+          <a:prstGeom prst="rect">
+            <a:avLst/>
+          </a:prstGeom>
+          <a:solidFill>
+            <a:schemeClr val="bg1"/>
+          </a:solidFill>
+          <a:ln>
+            <a:solidFill>
+              <a:schemeClr val="tx1"/>
+            </a:solidFill>
+          </a:ln>
+        </p:spPr>
+        <p:style>
+          <a:lnRef idx="2">
+            <a:schemeClr val="accent1">
+              <a:shade val="50000"/>
+            </a:schemeClr>
+          </a:lnRef>
+          <a:fillRef idx="1">
+            <a:schemeClr val="accent1"/>
+          </a:fillRef>
+          <a:effectRef idx="0">
+            <a:schemeClr val="accent1"/>
+          </a:effectRef>
+          <a:fontRef idx="minor">
+            <a:schemeClr val="lt1"/>
+          </a:fontRef>
+        </p:style>
+        <p:txBody>
+          <a:bodyPr rtlCol="0" anchor="ctr"/>
+          <a:lstStyle/>
+          <a:p>
+            <a:r>
+              <a:rPr lang="en-US" sz="1600" smtClean="0">
+                <a:solidFill>
+                  <a:schemeClr val="tx1"/>
+                </a:solidFill>
+                <a:latin typeface="Tahoma" panose="020B0604030504040204" pitchFamily="34" charset="0"/>
+                <a:ea typeface="Tahoma" panose="020B0604030504040204" pitchFamily="34" charset="0"/>
+                <a:cs typeface="Tahoma" panose="020B0604030504040204" pitchFamily="34" charset="0"/>
+              </a:rPr>
+              <a:t>Đối tượng B</a:t>
+            </a:r>
+            <a:endParaRPr lang="en-US" sz="1600">
+              <a:solidFill>
+                <a:schemeClr val="tx1"/>
+              </a:solidFill>
+              <a:latin typeface="Tahoma" panose="020B0604030504040204" pitchFamily="34" charset="0"/>
+              <a:ea typeface="Tahoma" panose="020B0604030504040204" pitchFamily="34" charset="0"/>
+              <a:cs typeface="Tahoma" panose="020B0604030504040204" pitchFamily="34" charset="0"/>
+            </a:endParaRPr>
+          </a:p>
+        </p:txBody>
+      </p:sp>
+      <p:sp>
+        <p:nvSpPr>
+          <p:cNvPr id="9" name="Rectangle 8"/>
+          <p:cNvSpPr/>
+          <p:nvPr/>
+        </p:nvSpPr>
+        <p:spPr>
+          <a:xfrm>
+            <a:off x="1806083" y="2980710"/>
+            <a:ext cx="1453243" cy="435429"/>
+          </a:xfrm>
+          <a:prstGeom prst="rect">
+            <a:avLst/>
+          </a:prstGeom>
+          <a:solidFill>
+            <a:schemeClr val="bg1"/>
+          </a:solidFill>
+          <a:ln>
+            <a:solidFill>
+              <a:schemeClr val="tx1"/>
+            </a:solidFill>
+          </a:ln>
+        </p:spPr>
+        <p:style>
+          <a:lnRef idx="2">
+            <a:schemeClr val="accent1">
+              <a:shade val="50000"/>
+            </a:schemeClr>
+          </a:lnRef>
+          <a:fillRef idx="1">
+            <a:schemeClr val="accent1"/>
+          </a:fillRef>
+          <a:effectRef idx="0">
+            <a:schemeClr val="accent1"/>
+          </a:effectRef>
+          <a:fontRef idx="minor">
+            <a:schemeClr val="lt1"/>
+          </a:fontRef>
+        </p:style>
+        <p:txBody>
+          <a:bodyPr rtlCol="0" anchor="ctr"/>
+          <a:lstStyle/>
+          <a:p>
+            <a:r>
+              <a:rPr lang="en-US" sz="1600" smtClean="0">
+                <a:solidFill>
+                  <a:schemeClr val="tx1"/>
+                </a:solidFill>
+                <a:latin typeface="Tahoma" panose="020B0604030504040204" pitchFamily="34" charset="0"/>
+                <a:ea typeface="Tahoma" panose="020B0604030504040204" pitchFamily="34" charset="0"/>
+                <a:cs typeface="Tahoma" panose="020B0604030504040204" pitchFamily="34" charset="0"/>
+              </a:rPr>
+              <a:t>Đối tượng C</a:t>
+            </a:r>
+            <a:endParaRPr lang="en-US" sz="1600">
+              <a:solidFill>
+                <a:schemeClr val="tx1"/>
+              </a:solidFill>
+              <a:latin typeface="Tahoma" panose="020B0604030504040204" pitchFamily="34" charset="0"/>
+              <a:ea typeface="Tahoma" panose="020B0604030504040204" pitchFamily="34" charset="0"/>
+              <a:cs typeface="Tahoma" panose="020B0604030504040204" pitchFamily="34" charset="0"/>
+            </a:endParaRPr>
+          </a:p>
+        </p:txBody>
+      </p:sp>
+      <p:cxnSp>
+        <p:nvCxnSpPr>
+          <p:cNvPr id="10" name="Straight Connector 9"/>
+          <p:cNvCxnSpPr/>
+          <p:nvPr/>
+        </p:nvCxnSpPr>
+        <p:spPr>
+          <a:xfrm>
+            <a:off x="2512332" y="1132570"/>
+            <a:ext cx="0" cy="535215"/>
+          </a:xfrm>
+          <a:prstGeom prst="line">
+            <a:avLst/>
+          </a:prstGeom>
+          <a:ln w="28575">
+            <a:solidFill>
+              <a:schemeClr val="tx1"/>
+            </a:solidFill>
+            <a:headEnd type="none" w="med" len="med"/>
+            <a:tailEnd type="arrow" w="med" len="med"/>
+          </a:ln>
+        </p:spPr>
+        <p:style>
+          <a:lnRef idx="1">
+            <a:schemeClr val="accent1"/>
+          </a:lnRef>
+          <a:fillRef idx="0">
+            <a:schemeClr val="accent1"/>
+          </a:fillRef>
+          <a:effectRef idx="0">
+            <a:schemeClr val="accent1"/>
+          </a:effectRef>
+          <a:fontRef idx="minor">
+            <a:schemeClr val="tx1"/>
+          </a:fontRef>
+        </p:style>
+      </p:cxnSp>
+      <p:cxnSp>
+        <p:nvCxnSpPr>
+          <p:cNvPr id="11" name="Straight Connector 10"/>
+          <p:cNvCxnSpPr/>
+          <p:nvPr/>
+        </p:nvCxnSpPr>
+        <p:spPr>
+          <a:xfrm>
+            <a:off x="2512332" y="2313670"/>
+            <a:ext cx="0" cy="535215"/>
+          </a:xfrm>
+          <a:prstGeom prst="line">
+            <a:avLst/>
+          </a:prstGeom>
+          <a:ln w="28575">
+            <a:solidFill>
+              <a:schemeClr val="tx1"/>
+            </a:solidFill>
+            <a:headEnd type="none" w="med" len="med"/>
+            <a:tailEnd type="arrow" w="med" len="med"/>
+          </a:ln>
+        </p:spPr>
+        <p:style>
+          <a:lnRef idx="1">
+            <a:schemeClr val="accent1"/>
+          </a:lnRef>
+          <a:fillRef idx="0">
+            <a:schemeClr val="accent1"/>
+          </a:fillRef>
+          <a:effectRef idx="0">
+            <a:schemeClr val="accent1"/>
+          </a:effectRef>
+          <a:fontRef idx="minor">
+            <a:schemeClr val="tx1"/>
+          </a:fontRef>
+        </p:style>
+      </p:cxnSp>
+      <p:sp>
+        <p:nvSpPr>
+          <p:cNvPr id="12" name="Rectangle 11"/>
+          <p:cNvSpPr/>
+          <p:nvPr/>
+        </p:nvSpPr>
+        <p:spPr>
+          <a:xfrm>
+            <a:off x="4292524" y="2980710"/>
+            <a:ext cx="2213207" cy="435429"/>
+          </a:xfrm>
+          <a:prstGeom prst="rect">
+            <a:avLst/>
+          </a:prstGeom>
+          <a:solidFill>
+            <a:schemeClr val="bg1"/>
+          </a:solidFill>
+          <a:ln>
+            <a:solidFill>
+              <a:schemeClr val="tx1"/>
+            </a:solidFill>
+          </a:ln>
+        </p:spPr>
+        <p:style>
+          <a:lnRef idx="2">
+            <a:schemeClr val="accent1">
+              <a:shade val="50000"/>
+            </a:schemeClr>
+          </a:lnRef>
+          <a:fillRef idx="1">
+            <a:schemeClr val="accent1"/>
+          </a:fillRef>
+          <a:effectRef idx="0">
+            <a:schemeClr val="accent1"/>
+          </a:effectRef>
+          <a:fontRef idx="minor">
+            <a:schemeClr val="lt1"/>
+          </a:fontRef>
+        </p:style>
+        <p:txBody>
+          <a:bodyPr rtlCol="0" anchor="ctr"/>
+          <a:lstStyle/>
+          <a:p>
+            <a:r>
+              <a:rPr lang="en-US" sz="1600" smtClean="0">
+                <a:solidFill>
+                  <a:schemeClr val="tx1"/>
+                </a:solidFill>
+                <a:latin typeface="Tahoma" panose="020B0604030504040204" pitchFamily="34" charset="0"/>
+                <a:ea typeface="Tahoma" panose="020B0604030504040204" pitchFamily="34" charset="0"/>
+                <a:cs typeface="Tahoma" panose="020B0604030504040204" pitchFamily="34" charset="0"/>
+              </a:rPr>
+              <a:t>Tập hợp đối tượng B</a:t>
+            </a:r>
+            <a:endParaRPr lang="en-US" sz="1600">
+              <a:solidFill>
+                <a:schemeClr val="tx1"/>
+              </a:solidFill>
+              <a:latin typeface="Tahoma" panose="020B0604030504040204" pitchFamily="34" charset="0"/>
+              <a:ea typeface="Tahoma" panose="020B0604030504040204" pitchFamily="34" charset="0"/>
+              <a:cs typeface="Tahoma" panose="020B0604030504040204" pitchFamily="34" charset="0"/>
+            </a:endParaRPr>
+          </a:p>
+        </p:txBody>
+      </p:sp>
+      <p:cxnSp>
+        <p:nvCxnSpPr>
+          <p:cNvPr id="16" name="Straight Connector 15"/>
+          <p:cNvCxnSpPr/>
+          <p:nvPr/>
+        </p:nvCxnSpPr>
+        <p:spPr>
+          <a:xfrm>
+            <a:off x="3364258" y="3224326"/>
+            <a:ext cx="883298" cy="0"/>
+          </a:xfrm>
+          <a:prstGeom prst="line">
+            <a:avLst/>
+          </a:prstGeom>
+          <a:ln w="28575">
+            <a:solidFill>
+              <a:schemeClr val="tx1"/>
+            </a:solidFill>
+            <a:prstDash val="dash"/>
+            <a:headEnd type="none" w="med" len="med"/>
+            <a:tailEnd type="arrow" w="med" len="med"/>
+          </a:ln>
+        </p:spPr>
+        <p:style>
+          <a:lnRef idx="1">
+            <a:schemeClr val="accent1"/>
+          </a:lnRef>
+          <a:fillRef idx="0">
+            <a:schemeClr val="accent1"/>
+          </a:fillRef>
+          <a:effectRef idx="0">
+            <a:schemeClr val="accent1"/>
+          </a:effectRef>
+          <a:fontRef idx="minor">
+            <a:schemeClr val="tx1"/>
+          </a:fontRef>
+        </p:style>
+      </p:cxnSp>
+      <p:cxnSp>
+        <p:nvCxnSpPr>
+          <p:cNvPr id="18" name="Straight Connector 17"/>
+          <p:cNvCxnSpPr/>
+          <p:nvPr/>
+        </p:nvCxnSpPr>
+        <p:spPr>
+          <a:xfrm>
+            <a:off x="3364256" y="2010123"/>
+            <a:ext cx="883298" cy="0"/>
+          </a:xfrm>
+          <a:prstGeom prst="line">
+            <a:avLst/>
+          </a:prstGeom>
+          <a:ln w="28575">
+            <a:solidFill>
+              <a:schemeClr val="tx1"/>
+            </a:solidFill>
+            <a:prstDash val="dash"/>
+            <a:headEnd type="none" w="med" len="med"/>
+            <a:tailEnd type="arrow" w="med" len="med"/>
+          </a:ln>
+        </p:spPr>
+        <p:style>
+          <a:lnRef idx="1">
+            <a:schemeClr val="accent1"/>
+          </a:lnRef>
+          <a:fillRef idx="0">
+            <a:schemeClr val="accent1"/>
+          </a:fillRef>
+          <a:effectRef idx="0">
+            <a:schemeClr val="accent1"/>
+          </a:effectRef>
+          <a:fontRef idx="minor">
+            <a:schemeClr val="tx1"/>
+          </a:fontRef>
+        </p:style>
+      </p:cxnSp>
+      <p:sp>
+        <p:nvSpPr>
+          <p:cNvPr id="19" name="Rectangle 18"/>
+          <p:cNvSpPr/>
+          <p:nvPr/>
+        </p:nvSpPr>
+        <p:spPr>
+          <a:xfrm>
+            <a:off x="4352483" y="1768703"/>
+            <a:ext cx="2153248" cy="435429"/>
+          </a:xfrm>
+          <a:prstGeom prst="rect">
+            <a:avLst/>
+          </a:prstGeom>
+          <a:solidFill>
+            <a:schemeClr val="bg1"/>
+          </a:solidFill>
+          <a:ln>
+            <a:solidFill>
+              <a:schemeClr val="tx1"/>
+            </a:solidFill>
+          </a:ln>
+        </p:spPr>
+        <p:style>
+          <a:lnRef idx="2">
+            <a:schemeClr val="accent1">
+              <a:shade val="50000"/>
+            </a:schemeClr>
+          </a:lnRef>
+          <a:fillRef idx="1">
+            <a:schemeClr val="accent1"/>
+          </a:fillRef>
+          <a:effectRef idx="0">
+            <a:schemeClr val="accent1"/>
+          </a:effectRef>
+          <a:fontRef idx="minor">
+            <a:schemeClr val="lt1"/>
+          </a:fontRef>
+        </p:style>
+        <p:txBody>
+          <a:bodyPr rtlCol="0" anchor="ctr"/>
+          <a:lstStyle/>
+          <a:p>
+            <a:r>
+              <a:rPr lang="en-US" sz="1600" smtClean="0">
+                <a:solidFill>
+                  <a:schemeClr val="tx1"/>
+                </a:solidFill>
+                <a:latin typeface="Tahoma" panose="020B0604030504040204" pitchFamily="34" charset="0"/>
+                <a:ea typeface="Tahoma" panose="020B0604030504040204" pitchFamily="34" charset="0"/>
+                <a:cs typeface="Tahoma" panose="020B0604030504040204" pitchFamily="34" charset="0"/>
+              </a:rPr>
+              <a:t>Tập hợp đối tượng A</a:t>
+            </a:r>
+            <a:endParaRPr lang="en-US" sz="1600">
+              <a:solidFill>
+                <a:schemeClr val="tx1"/>
+              </a:solidFill>
+              <a:latin typeface="Tahoma" panose="020B0604030504040204" pitchFamily="34" charset="0"/>
+              <a:ea typeface="Tahoma" panose="020B0604030504040204" pitchFamily="34" charset="0"/>
+              <a:cs typeface="Tahoma" panose="020B0604030504040204" pitchFamily="34" charset="0"/>
+            </a:endParaRPr>
+          </a:p>
+        </p:txBody>
+      </p:sp>
+      <p:cxnSp>
+        <p:nvCxnSpPr>
+          <p:cNvPr id="22" name="Straight Connector 21"/>
+          <p:cNvCxnSpPr/>
+          <p:nvPr/>
+        </p:nvCxnSpPr>
+        <p:spPr>
+          <a:xfrm rot="-5400000">
+            <a:off x="4655925" y="396024"/>
+            <a:ext cx="0" cy="535215"/>
+          </a:xfrm>
+          <a:prstGeom prst="line">
+            <a:avLst/>
+          </a:prstGeom>
+          <a:ln w="28575">
+            <a:solidFill>
+              <a:schemeClr val="tx1"/>
+            </a:solidFill>
+            <a:headEnd type="none" w="med" len="med"/>
+            <a:tailEnd type="arrow" w="med" len="med"/>
+          </a:ln>
+        </p:spPr>
+        <p:style>
+          <a:lnRef idx="1">
+            <a:schemeClr val="accent1"/>
+          </a:lnRef>
+          <a:fillRef idx="0">
+            <a:schemeClr val="accent1"/>
+          </a:fillRef>
+          <a:effectRef idx="0">
+            <a:schemeClr val="accent1"/>
+          </a:effectRef>
+          <a:fontRef idx="minor">
+            <a:schemeClr val="tx1"/>
+          </a:fontRef>
+        </p:style>
+      </p:cxnSp>
+      <p:sp>
+        <p:nvSpPr>
+          <p:cNvPr id="23" name="Rectangle 22"/>
+          <p:cNvSpPr/>
+          <p:nvPr/>
+        </p:nvSpPr>
+        <p:spPr>
+          <a:xfrm>
+            <a:off x="5048147" y="444407"/>
+            <a:ext cx="2686778" cy="435429"/>
+          </a:xfrm>
+          <a:prstGeom prst="rect">
+            <a:avLst/>
+          </a:prstGeom>
+          <a:solidFill>
+            <a:schemeClr val="bg1"/>
+          </a:solidFill>
+          <a:ln>
+            <a:noFill/>
+          </a:ln>
+        </p:spPr>
+        <p:style>
+          <a:lnRef idx="2">
+            <a:schemeClr val="accent1">
+              <a:shade val="50000"/>
+            </a:schemeClr>
+          </a:lnRef>
+          <a:fillRef idx="1">
+            <a:schemeClr val="accent1"/>
+          </a:fillRef>
+          <a:effectRef idx="0">
+            <a:schemeClr val="accent1"/>
+          </a:effectRef>
+          <a:fontRef idx="minor">
+            <a:schemeClr val="lt1"/>
+          </a:fontRef>
+        </p:style>
+        <p:txBody>
+          <a:bodyPr rtlCol="0" anchor="ctr"/>
+          <a:lstStyle/>
+          <a:p>
+            <a:r>
+              <a:rPr lang="en-US" sz="1600" smtClean="0">
+                <a:solidFill>
+                  <a:schemeClr val="tx1"/>
+                </a:solidFill>
+                <a:latin typeface="Tahoma" panose="020B0604030504040204" pitchFamily="34" charset="0"/>
+                <a:ea typeface="Tahoma" panose="020B0604030504040204" pitchFamily="34" charset="0"/>
+                <a:cs typeface="Tahoma" panose="020B0604030504040204" pitchFamily="34" charset="0"/>
+              </a:rPr>
+              <a:t>Quan hệ chính (trực tiếp)</a:t>
+            </a:r>
+            <a:endParaRPr lang="en-US" sz="1600">
+              <a:solidFill>
+                <a:schemeClr val="tx1"/>
+              </a:solidFill>
+              <a:latin typeface="Tahoma" panose="020B0604030504040204" pitchFamily="34" charset="0"/>
+              <a:ea typeface="Tahoma" panose="020B0604030504040204" pitchFamily="34" charset="0"/>
+              <a:cs typeface="Tahoma" panose="020B0604030504040204" pitchFamily="34" charset="0"/>
+            </a:endParaRPr>
+          </a:p>
+        </p:txBody>
+      </p:sp>
+      <p:cxnSp>
+        <p:nvCxnSpPr>
+          <p:cNvPr id="24" name="Straight Connector 23"/>
+          <p:cNvCxnSpPr/>
+          <p:nvPr/>
+        </p:nvCxnSpPr>
+        <p:spPr>
+          <a:xfrm>
+            <a:off x="4388317" y="1113983"/>
+            <a:ext cx="535216" cy="0"/>
+          </a:xfrm>
+          <a:prstGeom prst="line">
+            <a:avLst/>
+          </a:prstGeom>
+          <a:ln w="28575">
+            <a:solidFill>
+              <a:schemeClr val="tx1"/>
+            </a:solidFill>
+            <a:prstDash val="dash"/>
+            <a:headEnd type="none" w="med" len="med"/>
+            <a:tailEnd type="arrow" w="med" len="med"/>
+          </a:ln>
+        </p:spPr>
+        <p:style>
+          <a:lnRef idx="1">
+            <a:schemeClr val="accent1"/>
+          </a:lnRef>
+          <a:fillRef idx="0">
+            <a:schemeClr val="accent1"/>
+          </a:fillRef>
+          <a:effectRef idx="0">
+            <a:schemeClr val="accent1"/>
+          </a:effectRef>
+          <a:fontRef idx="minor">
+            <a:schemeClr val="tx1"/>
+          </a:fontRef>
+        </p:style>
+      </p:cxnSp>
+      <p:sp>
+        <p:nvSpPr>
+          <p:cNvPr id="26" name="Rectangle 25"/>
+          <p:cNvSpPr/>
+          <p:nvPr/>
+        </p:nvSpPr>
+        <p:spPr>
+          <a:xfrm>
+            <a:off x="5048146" y="896268"/>
+            <a:ext cx="3061533" cy="435429"/>
+          </a:xfrm>
+          <a:prstGeom prst="rect">
+            <a:avLst/>
+          </a:prstGeom>
+          <a:solidFill>
+            <a:schemeClr val="bg1"/>
+          </a:solidFill>
+          <a:ln>
+            <a:noFill/>
+          </a:ln>
+        </p:spPr>
+        <p:style>
+          <a:lnRef idx="2">
+            <a:schemeClr val="accent1">
+              <a:shade val="50000"/>
+            </a:schemeClr>
+          </a:lnRef>
+          <a:fillRef idx="1">
+            <a:schemeClr val="accent1"/>
+          </a:fillRef>
+          <a:effectRef idx="0">
+            <a:schemeClr val="accent1"/>
+          </a:effectRef>
+          <a:fontRef idx="minor">
+            <a:schemeClr val="lt1"/>
+          </a:fontRef>
+        </p:style>
+        <p:txBody>
+          <a:bodyPr rtlCol="0" anchor="ctr"/>
+          <a:lstStyle/>
+          <a:p>
+            <a:r>
+              <a:rPr lang="en-US" sz="1600" smtClean="0">
+                <a:solidFill>
+                  <a:schemeClr val="tx1"/>
+                </a:solidFill>
+                <a:latin typeface="Tahoma" panose="020B0604030504040204" pitchFamily="34" charset="0"/>
+                <a:ea typeface="Tahoma" panose="020B0604030504040204" pitchFamily="34" charset="0"/>
+                <a:cs typeface="Tahoma" panose="020B0604030504040204" pitchFamily="34" charset="0"/>
+              </a:rPr>
+              <a:t>Quan hệ ngược (gián tiếp)</a:t>
+            </a:r>
+            <a:endParaRPr lang="en-US" sz="1600">
+              <a:solidFill>
+                <a:schemeClr val="tx1"/>
+              </a:solidFill>
+              <a:latin typeface="Tahoma" panose="020B0604030504040204" pitchFamily="34" charset="0"/>
+              <a:ea typeface="Tahoma" panose="020B0604030504040204" pitchFamily="34" charset="0"/>
+              <a:cs typeface="Tahoma" panose="020B0604030504040204" pitchFamily="34" charset="0"/>
+            </a:endParaRPr>
+          </a:p>
+        </p:txBody>
+      </p:sp>
+      <p:sp>
+        <p:nvSpPr>
+          <p:cNvPr id="27" name="Rectangle 26"/>
+          <p:cNvSpPr/>
+          <p:nvPr/>
+        </p:nvSpPr>
+        <p:spPr>
+          <a:xfrm rot="16200000">
+            <a:off x="-222419" y="1667658"/>
+            <a:ext cx="3061533" cy="435429"/>
+          </a:xfrm>
+          <a:prstGeom prst="rect">
+            <a:avLst/>
+          </a:prstGeom>
+          <a:solidFill>
+            <a:schemeClr val="bg1"/>
+          </a:solidFill>
+          <a:ln>
+            <a:noFill/>
+          </a:ln>
+        </p:spPr>
+        <p:style>
+          <a:lnRef idx="2">
+            <a:schemeClr val="accent1">
+              <a:shade val="50000"/>
+            </a:schemeClr>
+          </a:lnRef>
+          <a:fillRef idx="1">
+            <a:schemeClr val="accent1"/>
+          </a:fillRef>
+          <a:effectRef idx="0">
+            <a:schemeClr val="accent1"/>
+          </a:effectRef>
+          <a:fontRef idx="minor">
+            <a:schemeClr val="lt1"/>
+          </a:fontRef>
+        </p:style>
+        <p:txBody>
+          <a:bodyPr rtlCol="0" anchor="ctr"/>
+          <a:lstStyle/>
+          <a:p>
+            <a:r>
+              <a:rPr lang="en-US" sz="1600" smtClean="0">
+                <a:solidFill>
+                  <a:schemeClr val="tx1"/>
+                </a:solidFill>
+                <a:latin typeface="Tahoma" panose="020B0604030504040204" pitchFamily="34" charset="0"/>
+                <a:ea typeface="Tahoma" panose="020B0604030504040204" pitchFamily="34" charset="0"/>
+                <a:cs typeface="Tahoma" panose="020B0604030504040204" pitchFamily="34" charset="0"/>
+              </a:rPr>
+              <a:t>Cây liên hệ có chiều cao là 2</a:t>
+            </a:r>
+            <a:endParaRPr lang="en-US" sz="1600">
+              <a:solidFill>
+                <a:schemeClr val="tx1"/>
+              </a:solidFill>
+              <a:latin typeface="Tahoma" panose="020B0604030504040204" pitchFamily="34" charset="0"/>
+              <a:ea typeface="Tahoma" panose="020B0604030504040204" pitchFamily="34" charset="0"/>
+              <a:cs typeface="Tahoma" panose="020B0604030504040204" pitchFamily="34" charset="0"/>
+            </a:endParaRPr>
+          </a:p>
+        </p:txBody>
+      </p:sp>
+      <p:sp>
+        <p:nvSpPr>
+          <p:cNvPr id="28" name="Rectangle 27"/>
+          <p:cNvSpPr/>
+          <p:nvPr/>
+        </p:nvSpPr>
+        <p:spPr>
+          <a:xfrm>
+            <a:off x="1775281" y="3627658"/>
+            <a:ext cx="5165165" cy="435429"/>
+          </a:xfrm>
+          <a:prstGeom prst="rect">
+            <a:avLst/>
+          </a:prstGeom>
+          <a:solidFill>
+            <a:schemeClr val="bg1"/>
+          </a:solidFill>
+          <a:ln>
+            <a:noFill/>
+          </a:ln>
+        </p:spPr>
+        <p:style>
+          <a:lnRef idx="2">
+            <a:schemeClr val="accent1">
+              <a:shade val="50000"/>
+            </a:schemeClr>
+          </a:lnRef>
+          <a:fillRef idx="1">
+            <a:schemeClr val="accent1"/>
+          </a:fillRef>
+          <a:effectRef idx="0">
+            <a:schemeClr val="accent1"/>
+          </a:effectRef>
+          <a:fontRef idx="minor">
+            <a:schemeClr val="lt1"/>
+          </a:fontRef>
+        </p:style>
+        <p:txBody>
+          <a:bodyPr rtlCol="0" anchor="ctr"/>
+          <a:lstStyle/>
+          <a:p>
+            <a:r>
+              <a:rPr lang="en-US" sz="1600" smtClean="0">
+                <a:solidFill>
+                  <a:schemeClr val="tx1"/>
+                </a:solidFill>
+                <a:latin typeface="Tahoma" panose="020B0604030504040204" pitchFamily="34" charset="0"/>
+                <a:ea typeface="Tahoma" panose="020B0604030504040204" pitchFamily="34" charset="0"/>
+                <a:cs typeface="Tahoma" panose="020B0604030504040204" pitchFamily="34" charset="0"/>
+              </a:rPr>
+              <a:t>Tham chiếu mức 2 từ A đến C có dạng: A-&gt;B-&gt;C</a:t>
+            </a:r>
+            <a:endParaRPr lang="en-US" sz="1600">
+              <a:solidFill>
+                <a:schemeClr val="tx1"/>
+              </a:solidFill>
+              <a:latin typeface="Tahoma" panose="020B0604030504040204" pitchFamily="34" charset="0"/>
+              <a:ea typeface="Tahoma" panose="020B0604030504040204" pitchFamily="34" charset="0"/>
+              <a:cs typeface="Tahoma" panose="020B0604030504040204" pitchFamily="34" charset="0"/>
+            </a:endParaRPr>
+          </a:p>
+        </p:txBody>
+      </p:sp>
+    </p:spTree>
+    <p:extLst>
+      <p:ext uri="{BB962C8B-B14F-4D97-AF65-F5344CB8AC3E}">
+        <p14:creationId xmlns:p14="http://schemas.microsoft.com/office/powerpoint/2010/main" val="1880530484"/>
       </p:ext>
     </p:extLst>
   </p:cSld>

</xml_diff>

<commit_message>
Thêm khóa semaphore khi đồng bộ đa luồng
</commit_message>
<xml_diff>
--- a/_BaoCao/quocdunginfo/EF features model.pptx
+++ b/_BaoCao/quocdunginfo/EF features model.pptx
@@ -7746,7 +7746,21 @@
                 <a:ea typeface="Tahoma" panose="020B0604030504040204" pitchFamily="34" charset="0"/>
                 <a:cs typeface="Tahoma" panose="020B0604030504040204" pitchFamily="34" charset="0"/>
               </a:rPr>
-              <a:t>Hệ thống theo dõi và xử lý tác vụ của Entity Framework</a:t>
+              <a:t>Hệ thống theo dõi và xử lý tác vụ của</a:t>
+            </a:r>
+          </a:p>
+          <a:p>
+            <a:pPr algn="ctr"/>
+            <a:r>
+              <a:rPr lang="en-US" sz="1600" smtClean="0">
+                <a:solidFill>
+                  <a:schemeClr val="tx1"/>
+                </a:solidFill>
+                <a:latin typeface="Tahoma" panose="020B0604030504040204" pitchFamily="34" charset="0"/>
+                <a:ea typeface="Tahoma" panose="020B0604030504040204" pitchFamily="34" charset="0"/>
+                <a:cs typeface="Tahoma" panose="020B0604030504040204" pitchFamily="34" charset="0"/>
+              </a:rPr>
+              <a:t>Entity Framework</a:t>
             </a:r>
           </a:p>
         </p:txBody>

</xml_diff>